<commit_message>
Added code and other business case documents
</commit_message>
<xml_diff>
--- a/Documents/Data-flow Diagram (logical and Physical)/Dataflow Diagram_Logical_V2_Team2.pptx
+++ b/Documents/Data-flow Diagram (logical and Physical)/Dataflow Diagram_Logical_V2_Team2.pptx
@@ -257,7 +257,7 @@
       </p15:sldGuideLst>
     </p:ext>
     <p:ext uri="http://customooxmlschemas.google.com/">
-      <go:slidesCustomData xmlns:go="http://customooxmlschemas.google.com/" r:id="rId7" roundtripDataSignature="AMtx7mhgZfnP4VnoWWM9AicDJyXtjMsPEA=="/>
+      <go:slidesCustomData xmlns:go="http://customooxmlschemas.google.com/" r:id="rId7" roundtripDataSignature="AMtx7mhSivgt/+y4XC82ASBrAWm1WcH09w=="/>
     </p:ext>
   </p:extLst>
 </p:presentation>
@@ -10683,7 +10683,7 @@
         </p:blipFill>
         <p:spPr>
           <a:xfrm>
-            <a:off x="260897" y="2226913"/>
+            <a:off x="260897" y="1977638"/>
             <a:ext cx="323865" cy="744625"/>
           </a:xfrm>
           <a:prstGeom prst="rect">
@@ -10703,7 +10703,7 @@
         </p:nvSpPr>
         <p:spPr>
           <a:xfrm>
-            <a:off x="2351900" y="1308825"/>
+            <a:off x="2170450" y="890513"/>
             <a:ext cx="1373100" cy="509700"/>
           </a:xfrm>
           <a:prstGeom prst="rect">
@@ -10744,7 +10744,7 @@
                 <a:cs typeface="Calibri"/>
                 <a:sym typeface="Calibri"/>
               </a:rPr>
-              <a:t>01.01 Register/Sign Account</a:t>
+              <a:t>01.01 Register Account</a:t>
             </a:r>
             <a:endParaRPr sz="1200">
               <a:latin typeface="Calibri"/>
@@ -10763,7 +10763,7 @@
         </p:nvSpPr>
         <p:spPr>
           <a:xfrm>
-            <a:off x="5161263" y="1308825"/>
+            <a:off x="5161138" y="890525"/>
             <a:ext cx="1486800" cy="509700"/>
           </a:xfrm>
           <a:prstGeom prst="rect">
@@ -10808,7 +10808,7 @@
                   <a:schemeClr val="dk1"/>
                 </a:solidFill>
               </a:rPr>
-              <a:t>03.01 Manage Customers</a:t>
+              <a:t>03.02 Manage Customers</a:t>
             </a:r>
             <a:endParaRPr sz="1200">
               <a:solidFill>
@@ -10826,7 +10826,7 @@
         </p:nvSpPr>
         <p:spPr>
           <a:xfrm>
-            <a:off x="2447150" y="2619663"/>
+            <a:off x="2395400" y="2975175"/>
             <a:ext cx="1373100" cy="509700"/>
           </a:xfrm>
           <a:prstGeom prst="rect">
@@ -10876,7 +10876,7 @@
         </p:nvSpPr>
         <p:spPr>
           <a:xfrm>
-            <a:off x="5816150" y="2657963"/>
+            <a:off x="5730338" y="2975163"/>
             <a:ext cx="1373100" cy="509700"/>
           </a:xfrm>
           <a:prstGeom prst="rect">
@@ -11156,8 +11156,8 @@
         </p:nvCxnSpPr>
         <p:spPr>
           <a:xfrm flipH="1" rot="10800000">
-            <a:off x="584762" y="1563625"/>
-            <a:ext cx="1767000" cy="1035600"/>
+            <a:off x="584762" y="1145450"/>
+            <a:ext cx="1585800" cy="1204500"/>
           </a:xfrm>
           <a:prstGeom prst="straightConnector1">
             <a:avLst/>
@@ -11185,8 +11185,8 @@
         </p:nvCxnSpPr>
         <p:spPr>
           <a:xfrm>
-            <a:off x="3725000" y="1563675"/>
-            <a:ext cx="1436400" cy="0"/>
+            <a:off x="3543550" y="1145363"/>
+            <a:ext cx="1617600" cy="0"/>
           </a:xfrm>
           <a:prstGeom prst="straightConnector1">
             <a:avLst/>
@@ -11214,8 +11214,8 @@
         </p:nvCxnSpPr>
         <p:spPr>
           <a:xfrm>
-            <a:off x="584762" y="2599225"/>
-            <a:ext cx="1862400" cy="275400"/>
+            <a:off x="584762" y="2349950"/>
+            <a:ext cx="1810500" cy="880200"/>
           </a:xfrm>
           <a:prstGeom prst="straightConnector1">
             <a:avLst/>
@@ -11272,8 +11272,8 @@
         </p:nvCxnSpPr>
         <p:spPr>
           <a:xfrm>
-            <a:off x="3820250" y="2874513"/>
-            <a:ext cx="1995900" cy="38400"/>
+            <a:off x="3768500" y="3230025"/>
+            <a:ext cx="1961700" cy="0"/>
           </a:xfrm>
           <a:prstGeom prst="straightConnector1">
             <a:avLst/>
@@ -11355,9 +11355,9 @@
           <p:nvPr/>
         </p:nvSpPr>
         <p:spPr>
-          <a:xfrm rot="-2050760">
-            <a:off x="793718" y="1653360"/>
-            <a:ext cx="1344642" cy="384918"/>
+          <a:xfrm rot="-2249626">
+            <a:off x="700664" y="1336378"/>
+            <a:ext cx="1344560" cy="369321"/>
           </a:xfrm>
           <a:prstGeom prst="rect">
             <a:avLst/>
@@ -11383,7 +11383,7 @@
               <a:buNone/>
             </a:pPr>
             <a:r>
-              <a:rPr lang="en-US" sz="1300">
+              <a:rPr lang="en-US" sz="1200">
                 <a:latin typeface="Calibri"/>
                 <a:ea typeface="Calibri"/>
                 <a:cs typeface="Calibri"/>
@@ -11391,7 +11391,7 @@
               </a:rPr>
               <a:t>Personal Info</a:t>
             </a:r>
-            <a:endParaRPr sz="1300">
+            <a:endParaRPr sz="1200">
               <a:latin typeface="Calibri"/>
               <a:ea typeface="Calibri"/>
               <a:cs typeface="Calibri"/>
@@ -11407,9 +11407,9 @@
           <p:nvPr/>
         </p:nvSpPr>
         <p:spPr>
-          <a:xfrm rot="1534">
-            <a:off x="3853736" y="1061221"/>
-            <a:ext cx="1344600" cy="384900"/>
+          <a:xfrm rot="1387">
+            <a:off x="3680049" y="856400"/>
+            <a:ext cx="1486800" cy="369300"/>
           </a:xfrm>
           <a:prstGeom prst="rect">
             <a:avLst/>
@@ -11435,15 +11435,15 @@
               <a:buNone/>
             </a:pPr>
             <a:r>
-              <a:rPr lang="en-US" sz="1300">
+              <a:rPr lang="en-US" sz="1200">
                 <a:latin typeface="Calibri"/>
                 <a:ea typeface="Calibri"/>
                 <a:cs typeface="Calibri"/>
                 <a:sym typeface="Calibri"/>
               </a:rPr>
-              <a:t>Verification</a:t>
+              <a:t>Registration Details</a:t>
             </a:r>
-            <a:endParaRPr sz="1300">
+            <a:endParaRPr sz="1200">
               <a:latin typeface="Calibri"/>
               <a:ea typeface="Calibri"/>
               <a:cs typeface="Calibri"/>
@@ -11460,8 +11460,8 @@
         </p:nvSpPr>
         <p:spPr>
           <a:xfrm>
-            <a:off x="979708" y="4309741"/>
-            <a:ext cx="1344600" cy="384900"/>
+            <a:off x="979708" y="4469191"/>
+            <a:ext cx="1344600" cy="369300"/>
           </a:xfrm>
           <a:prstGeom prst="rect">
             <a:avLst/>
@@ -11487,7 +11487,7 @@
               <a:buNone/>
             </a:pPr>
             <a:r>
-              <a:rPr lang="en-US" sz="1300">
+              <a:rPr lang="en-US" sz="1200">
                 <a:latin typeface="Calibri"/>
                 <a:ea typeface="Calibri"/>
                 <a:cs typeface="Calibri"/>
@@ -11495,7 +11495,7 @@
               </a:rPr>
               <a:t>Personal Info</a:t>
             </a:r>
-            <a:endParaRPr sz="1300">
+            <a:endParaRPr sz="1200">
               <a:latin typeface="Calibri"/>
               <a:ea typeface="Calibri"/>
               <a:cs typeface="Calibri"/>
@@ -11512,8 +11512,8 @@
         </p:nvSpPr>
         <p:spPr>
           <a:xfrm>
-            <a:off x="3906047" y="4469800"/>
-            <a:ext cx="1824300" cy="585000"/>
+            <a:off x="3839597" y="4469200"/>
+            <a:ext cx="1824300" cy="369300"/>
           </a:xfrm>
           <a:prstGeom prst="rect">
             <a:avLst/>
@@ -11539,15 +11539,15 @@
               <a:buNone/>
             </a:pPr>
             <a:r>
-              <a:rPr lang="en-US" sz="1300">
+              <a:rPr lang="en-US" sz="1200">
                 <a:latin typeface="Calibri"/>
                 <a:ea typeface="Calibri"/>
                 <a:cs typeface="Calibri"/>
                 <a:sym typeface="Calibri"/>
               </a:rPr>
-              <a:t>VIdeos and music snippets</a:t>
+              <a:t>Videos and music snippets</a:t>
             </a:r>
-            <a:endParaRPr sz="1300">
+            <a:endParaRPr sz="1200">
               <a:latin typeface="Calibri"/>
               <a:ea typeface="Calibri"/>
               <a:cs typeface="Calibri"/>
@@ -11565,7 +11565,7 @@
         <p:spPr>
           <a:xfrm rot="1822">
             <a:off x="2742175" y="5385246"/>
-            <a:ext cx="1698300" cy="585000"/>
+            <a:ext cx="1698300" cy="554100"/>
           </a:xfrm>
           <a:prstGeom prst="rect">
             <a:avLst/>
@@ -11596,7 +11596,7 @@
               <a:buNone/>
             </a:pPr>
             <a:r>
-              <a:rPr lang="en-US" sz="1300">
+              <a:rPr lang="en-US" sz="1200">
                 <a:solidFill>
                   <a:schemeClr val="dk1"/>
                 </a:solidFill>
@@ -11607,7 +11607,7 @@
               </a:rPr>
               <a:t>Verification</a:t>
             </a:r>
-            <a:endParaRPr sz="1300">
+            <a:endParaRPr sz="1200">
               <a:solidFill>
                 <a:schemeClr val="dk1"/>
               </a:solidFill>
@@ -11630,7 +11630,7 @@
             <a:r>
               <a:t/>
             </a:r>
-            <a:endParaRPr sz="1300">
+            <a:endParaRPr sz="1200">
               <a:latin typeface="Calibri"/>
               <a:ea typeface="Calibri"/>
               <a:cs typeface="Calibri"/>
@@ -11646,9 +11646,9 @@
           <p:nvPr/>
         </p:nvSpPr>
         <p:spPr>
-          <a:xfrm rot="382836">
-            <a:off x="876843" y="2811788"/>
-            <a:ext cx="1643983" cy="584735"/>
+          <a:xfrm rot="1450835">
+            <a:off x="895801" y="2956390"/>
+            <a:ext cx="1512400" cy="554020"/>
           </a:xfrm>
           <a:prstGeom prst="rect">
             <a:avLst/>
@@ -11674,7 +11674,7 @@
               <a:buNone/>
             </a:pPr>
             <a:r>
-              <a:rPr lang="en-US" sz="1300">
+              <a:rPr lang="en-US" sz="1200">
                 <a:latin typeface="Calibri"/>
                 <a:ea typeface="Calibri"/>
                 <a:cs typeface="Calibri"/>
@@ -11682,7 +11682,7 @@
               </a:rPr>
               <a:t>Payment for the selected services</a:t>
             </a:r>
-            <a:endParaRPr sz="1300">
+            <a:endParaRPr sz="1200">
               <a:latin typeface="Calibri"/>
               <a:ea typeface="Calibri"/>
               <a:cs typeface="Calibri"/>
@@ -11698,9 +11698,79 @@
           <p:nvPr/>
         </p:nvSpPr>
         <p:spPr>
-          <a:xfrm rot="1325">
-            <a:off x="5222929" y="1851700"/>
-            <a:ext cx="2334900" cy="523200"/>
+          <a:xfrm>
+            <a:off x="3944787" y="2863500"/>
+            <a:ext cx="1793400" cy="369300"/>
+          </a:xfrm>
+          <a:prstGeom prst="rect">
+            <a:avLst/>
+          </a:prstGeom>
+          <a:noFill/>
+          <a:ln>
+            <a:noFill/>
+          </a:ln>
+        </p:spPr>
+        <p:txBody>
+          <a:bodyPr anchorCtr="0" anchor="t" bIns="91425" lIns="91425" spcFirstLastPara="1" rIns="91425" wrap="square" tIns="91425">
+            <a:spAutoFit/>
+          </a:bodyPr>
+          <a:lstStyle/>
+          <a:p>
+            <a:pPr indent="0" lvl="0" marL="0" rtl="0" algn="l">
+              <a:spcBef>
+                <a:spcPts val="0"/>
+              </a:spcBef>
+              <a:spcAft>
+                <a:spcPts val="0"/>
+              </a:spcAft>
+              <a:buNone/>
+            </a:pPr>
+            <a:r>
+              <a:rPr lang="en-US" sz="1200">
+                <a:latin typeface="Calibri"/>
+                <a:ea typeface="Calibri"/>
+                <a:cs typeface="Calibri"/>
+                <a:sym typeface="Calibri"/>
+              </a:rPr>
+              <a:t>Review </a:t>
+            </a:r>
+            <a:r>
+              <a:rPr lang="en-US" sz="1200">
+                <a:latin typeface="Calibri"/>
+                <a:ea typeface="Calibri"/>
+                <a:cs typeface="Calibri"/>
+                <a:sym typeface="Calibri"/>
+              </a:rPr>
+              <a:t>their</a:t>
+            </a:r>
+            <a:r>
+              <a:rPr lang="en-US" sz="1200">
+                <a:latin typeface="Calibri"/>
+                <a:ea typeface="Calibri"/>
+                <a:cs typeface="Calibri"/>
+                <a:sym typeface="Calibri"/>
+              </a:rPr>
+              <a:t> bookings</a:t>
+            </a:r>
+            <a:endParaRPr sz="1200">
+              <a:latin typeface="Calibri"/>
+              <a:ea typeface="Calibri"/>
+              <a:cs typeface="Calibri"/>
+              <a:sym typeface="Calibri"/>
+            </a:endParaRPr>
+          </a:p>
+        </p:txBody>
+      </p:sp>
+      <p:sp>
+        <p:nvSpPr>
+          <p:cNvPr id="109" name="Google Shape;109;gc41ef6c38b_0_0"/>
+          <p:cNvSpPr txBox="1"/>
+          <p:nvPr/>
+        </p:nvSpPr>
+        <p:spPr>
+          <a:xfrm rot="1259">
+            <a:off x="4063778" y="6167525"/>
+            <a:ext cx="3276000" cy="369300"/>
           </a:xfrm>
           <a:prstGeom prst="rect">
             <a:avLst/>
@@ -11726,85 +11796,33 @@
               <a:buNone/>
             </a:pPr>
             <a:r>
-              <a:rPr lang="en-US" sz="1100">
+              <a:rPr lang="en-US" sz="1200">
                 <a:latin typeface="Calibri"/>
                 <a:ea typeface="Calibri"/>
                 <a:cs typeface="Calibri"/>
                 <a:sym typeface="Calibri"/>
               </a:rPr>
-              <a:t>Venues and services of musicians are shown based on location</a:t>
+              <a:t>Musician</a:t>
             </a:r>
-            <a:endParaRPr sz="1100">
-              <a:latin typeface="Calibri"/>
-              <a:ea typeface="Calibri"/>
-              <a:cs typeface="Calibri"/>
-              <a:sym typeface="Calibri"/>
-            </a:endParaRPr>
-          </a:p>
-        </p:txBody>
-      </p:sp>
-      <p:sp>
-        <p:nvSpPr>
-          <p:cNvPr id="109" name="Google Shape;109;gc41ef6c38b_0_0"/>
-          <p:cNvSpPr txBox="1"/>
-          <p:nvPr/>
-        </p:nvSpPr>
-        <p:spPr>
-          <a:xfrm>
-            <a:off x="3944787" y="2863500"/>
-            <a:ext cx="1793400" cy="384900"/>
-          </a:xfrm>
-          <a:prstGeom prst="rect">
-            <a:avLst/>
-          </a:prstGeom>
-          <a:noFill/>
-          <a:ln>
-            <a:noFill/>
-          </a:ln>
-        </p:spPr>
-        <p:txBody>
-          <a:bodyPr anchorCtr="0" anchor="t" bIns="91425" lIns="91425" spcFirstLastPara="1" rIns="91425" wrap="square" tIns="91425">
-            <a:spAutoFit/>
-          </a:bodyPr>
-          <a:lstStyle/>
-          <a:p>
-            <a:pPr indent="0" lvl="0" marL="0" rtl="0" algn="l">
-              <a:spcBef>
-                <a:spcPts val="0"/>
-              </a:spcBef>
-              <a:spcAft>
-                <a:spcPts val="0"/>
-              </a:spcAft>
-              <a:buNone/>
-            </a:pPr>
             <a:r>
-              <a:rPr lang="en-US" sz="1300">
+              <a:rPr lang="en-US" sz="1200">
                 <a:latin typeface="Calibri"/>
                 <a:ea typeface="Calibri"/>
                 <a:cs typeface="Calibri"/>
                 <a:sym typeface="Calibri"/>
               </a:rPr>
-              <a:t>Review </a:t>
+              <a:t> </a:t>
             </a:r>
             <a:r>
-              <a:rPr lang="en-US" sz="1300">
+              <a:rPr lang="en-US" sz="1200">
                 <a:latin typeface="Calibri"/>
                 <a:ea typeface="Calibri"/>
                 <a:cs typeface="Calibri"/>
                 <a:sym typeface="Calibri"/>
               </a:rPr>
-              <a:t>their</a:t>
+              <a:t>details and location</a:t>
             </a:r>
-            <a:r>
-              <a:rPr lang="en-US" sz="1300">
-                <a:latin typeface="Calibri"/>
-                <a:ea typeface="Calibri"/>
-                <a:cs typeface="Calibri"/>
-                <a:sym typeface="Calibri"/>
-              </a:rPr>
-              <a:t> bookings</a:t>
-            </a:r>
-            <a:endParaRPr sz="1300">
+            <a:endParaRPr sz="1200">
               <a:latin typeface="Calibri"/>
               <a:ea typeface="Calibri"/>
               <a:cs typeface="Calibri"/>
@@ -11820,78 +11838,8 @@
           <p:nvPr/>
         </p:nvSpPr>
         <p:spPr>
-          <a:xfrm rot="1259">
-            <a:off x="3993003" y="5984075"/>
-            <a:ext cx="3276000" cy="384900"/>
-          </a:xfrm>
-          <a:prstGeom prst="rect">
-            <a:avLst/>
-          </a:prstGeom>
-          <a:noFill/>
-          <a:ln>
-            <a:noFill/>
-          </a:ln>
-        </p:spPr>
-        <p:txBody>
-          <a:bodyPr anchorCtr="0" anchor="t" bIns="91425" lIns="91425" spcFirstLastPara="1" rIns="91425" wrap="square" tIns="91425">
-            <a:spAutoFit/>
-          </a:bodyPr>
-          <a:lstStyle/>
-          <a:p>
-            <a:pPr indent="0" lvl="0" marL="0" rtl="0" algn="ctr">
-              <a:spcBef>
-                <a:spcPts val="0"/>
-              </a:spcBef>
-              <a:spcAft>
-                <a:spcPts val="0"/>
-              </a:spcAft>
-              <a:buNone/>
-            </a:pPr>
-            <a:r>
-              <a:rPr lang="en-US" sz="1300">
-                <a:latin typeface="Calibri"/>
-                <a:ea typeface="Calibri"/>
-                <a:cs typeface="Calibri"/>
-                <a:sym typeface="Calibri"/>
-              </a:rPr>
-              <a:t>Musician</a:t>
-            </a:r>
-            <a:r>
-              <a:rPr lang="en-US" sz="1300">
-                <a:latin typeface="Calibri"/>
-                <a:ea typeface="Calibri"/>
-                <a:cs typeface="Calibri"/>
-                <a:sym typeface="Calibri"/>
-              </a:rPr>
-              <a:t> </a:t>
-            </a:r>
-            <a:r>
-              <a:rPr lang="en-US" sz="1300">
-                <a:latin typeface="Calibri"/>
-                <a:ea typeface="Calibri"/>
-                <a:cs typeface="Calibri"/>
-                <a:sym typeface="Calibri"/>
-              </a:rPr>
-              <a:t>details and location</a:t>
-            </a:r>
-            <a:endParaRPr sz="1300">
-              <a:latin typeface="Calibri"/>
-              <a:ea typeface="Calibri"/>
-              <a:cs typeface="Calibri"/>
-              <a:sym typeface="Calibri"/>
-            </a:endParaRPr>
-          </a:p>
-        </p:txBody>
-      </p:sp>
-      <p:sp>
-        <p:nvSpPr>
-          <p:cNvPr id="111" name="Google Shape;111;gc41ef6c38b_0_0"/>
-          <p:cNvSpPr txBox="1"/>
-          <p:nvPr/>
-        </p:nvSpPr>
-        <p:spPr>
           <a:xfrm>
-            <a:off x="-76075" y="2971525"/>
+            <a:off x="0" y="2679025"/>
             <a:ext cx="997800" cy="400200"/>
           </a:xfrm>
           <a:prstGeom prst="rect">
@@ -11937,7 +11885,7 @@
       </p:sp>
       <p:sp>
         <p:nvSpPr>
-          <p:cNvPr id="112" name="Google Shape;112;gc41ef6c38b_0_0"/>
+          <p:cNvPr id="111" name="Google Shape;111;gc41ef6c38b_0_0"/>
           <p:cNvSpPr txBox="1"/>
           <p:nvPr/>
         </p:nvSpPr>
@@ -11998,14 +11946,14 @@
       </p:sp>
       <p:sp>
         <p:nvSpPr>
-          <p:cNvPr id="113" name="Google Shape;113;gc41ef6c38b_0_0"/>
+          <p:cNvPr id="112" name="Google Shape;112;gc41ef6c38b_0_0"/>
           <p:cNvSpPr txBox="1"/>
           <p:nvPr/>
         </p:nvSpPr>
         <p:spPr>
           <a:xfrm rot="1534">
-            <a:off x="3702149" y="1749671"/>
-            <a:ext cx="1344600" cy="384900"/>
+            <a:off x="3680049" y="1230833"/>
+            <a:ext cx="1344600" cy="369300"/>
           </a:xfrm>
           <a:prstGeom prst="rect">
             <a:avLst/>
@@ -12031,7 +11979,7 @@
               <a:buNone/>
             </a:pPr>
             <a:r>
-              <a:rPr lang="en-US" sz="1300">
+              <a:rPr lang="en-US" sz="1200">
                 <a:latin typeface="Calibri"/>
                 <a:ea typeface="Calibri"/>
                 <a:cs typeface="Calibri"/>
@@ -12039,7 +11987,7 @@
               </a:rPr>
               <a:t>Confirmation</a:t>
             </a:r>
-            <a:endParaRPr sz="1300">
+            <a:endParaRPr sz="1200">
               <a:latin typeface="Calibri"/>
               <a:ea typeface="Calibri"/>
               <a:cs typeface="Calibri"/>
@@ -12050,14 +11998,14 @@
       </p:sp>
       <p:cxnSp>
         <p:nvCxnSpPr>
-          <p:cNvPr id="114" name="Google Shape;114;gc41ef6c38b_0_0"/>
+          <p:cNvPr id="113" name="Google Shape;113;gc41ef6c38b_0_0"/>
           <p:cNvCxnSpPr/>
           <p:nvPr/>
         </p:nvCxnSpPr>
         <p:spPr>
           <a:xfrm rot="10800000">
-            <a:off x="3732000" y="1692100"/>
-            <a:ext cx="1424100" cy="14100"/>
+            <a:off x="3551175" y="1293925"/>
+            <a:ext cx="1599600" cy="0"/>
           </a:xfrm>
           <a:prstGeom prst="straightConnector1">
             <a:avLst/>
@@ -12076,14 +12024,14 @@
       </p:cxnSp>
       <p:sp>
         <p:nvSpPr>
-          <p:cNvPr id="115" name="Google Shape;115;gc41ef6c38b_0_0"/>
+          <p:cNvPr id="114" name="Google Shape;114;gc41ef6c38b_0_0"/>
           <p:cNvSpPr txBox="1"/>
           <p:nvPr/>
         </p:nvSpPr>
         <p:spPr>
           <a:xfrm rot="1822">
             <a:off x="1383650" y="5385246"/>
-            <a:ext cx="1698300" cy="585000"/>
+            <a:ext cx="1698300" cy="554100"/>
           </a:xfrm>
           <a:prstGeom prst="rect">
             <a:avLst/>
@@ -12109,7 +12057,7 @@
               <a:buNone/>
             </a:pPr>
             <a:r>
-              <a:rPr lang="en-US" sz="1300">
+              <a:rPr lang="en-US" sz="1200">
                 <a:solidFill>
                   <a:schemeClr val="dk1"/>
                 </a:solidFill>
@@ -12120,7 +12068,7 @@
               </a:rPr>
               <a:t>Confirmation</a:t>
             </a:r>
-            <a:endParaRPr sz="1300">
+            <a:endParaRPr sz="1200">
               <a:solidFill>
                 <a:schemeClr val="dk1"/>
               </a:solidFill>
@@ -12143,7 +12091,7 @@
             <a:r>
               <a:t/>
             </a:r>
-            <a:endParaRPr sz="1300">
+            <a:endParaRPr sz="1200">
               <a:latin typeface="Calibri"/>
               <a:ea typeface="Calibri"/>
               <a:cs typeface="Calibri"/>
@@ -12154,7 +12102,7 @@
       </p:sp>
       <p:cxnSp>
         <p:nvCxnSpPr>
-          <p:cNvPr id="116" name="Google Shape;116;gc41ef6c38b_0_0"/>
+          <p:cNvPr id="115" name="Google Shape;115;gc41ef6c38b_0_0"/>
           <p:cNvCxnSpPr/>
           <p:nvPr/>
         </p:nvCxnSpPr>
@@ -12180,7 +12128,7 @@
       </p:cxnSp>
       <p:cxnSp>
         <p:nvCxnSpPr>
-          <p:cNvPr id="117" name="Google Shape;117;gc41ef6c38b_0_0"/>
+          <p:cNvPr id="116" name="Google Shape;116;gc41ef6c38b_0_0"/>
           <p:cNvCxnSpPr>
             <a:stCxn id="92" idx="3"/>
           </p:cNvCxnSpPr>
@@ -12208,7 +12156,7 @@
       </p:cxnSp>
       <p:cxnSp>
         <p:nvCxnSpPr>
-          <p:cNvPr id="118" name="Google Shape;118;gc41ef6c38b_0_0"/>
+          <p:cNvPr id="117" name="Google Shape;117;gc41ef6c38b_0_0"/>
           <p:cNvCxnSpPr>
             <a:endCxn id="91" idx="2"/>
           </p:cNvCxnSpPr>
@@ -12236,13 +12184,13 @@
       </p:cxnSp>
       <p:cxnSp>
         <p:nvCxnSpPr>
-          <p:cNvPr id="119" name="Google Shape;119;gc41ef6c38b_0_0"/>
+          <p:cNvPr id="118" name="Google Shape;118;gc41ef6c38b_0_0"/>
           <p:cNvCxnSpPr/>
           <p:nvPr/>
         </p:nvCxnSpPr>
         <p:spPr>
           <a:xfrm rot="10800000">
-            <a:off x="6653225" y="1559025"/>
+            <a:off x="6647950" y="1132713"/>
             <a:ext cx="1429500" cy="9600"/>
           </a:xfrm>
           <a:prstGeom prst="straightConnector1">
@@ -12262,7 +12210,7 @@
       </p:cxnSp>
       <p:cxnSp>
         <p:nvCxnSpPr>
-          <p:cNvPr id="120" name="Google Shape;120;gc41ef6c38b_0_0"/>
+          <p:cNvPr id="119" name="Google Shape;119;gc41ef6c38b_0_0"/>
           <p:cNvCxnSpPr>
             <a:endCxn id="91" idx="0"/>
           </p:cNvCxnSpPr>
@@ -12270,8 +12218,8 @@
         </p:nvCxnSpPr>
         <p:spPr>
           <a:xfrm>
-            <a:off x="8082600" y="1573475"/>
-            <a:ext cx="12900" cy="1759200"/>
+            <a:off x="8080800" y="1145375"/>
+            <a:ext cx="14700" cy="2187300"/>
           </a:xfrm>
           <a:prstGeom prst="straightConnector1">
             <a:avLst/>
@@ -12290,14 +12238,14 @@
       </p:cxnSp>
       <p:cxnSp>
         <p:nvCxnSpPr>
-          <p:cNvPr id="121" name="Google Shape;121;gc41ef6c38b_0_0"/>
+          <p:cNvPr id="120" name="Google Shape;120;gc41ef6c38b_0_0"/>
           <p:cNvCxnSpPr/>
           <p:nvPr/>
         </p:nvCxnSpPr>
         <p:spPr>
           <a:xfrm>
-            <a:off x="3141125" y="4171425"/>
-            <a:ext cx="3219300" cy="7800"/>
+            <a:off x="3055850" y="4160275"/>
+            <a:ext cx="3304500" cy="18900"/>
           </a:xfrm>
           <a:prstGeom prst="straightConnector1">
             <a:avLst/>
@@ -12316,14 +12264,14 @@
       </p:cxnSp>
       <p:sp>
         <p:nvSpPr>
-          <p:cNvPr id="122" name="Google Shape;122;gc41ef6c38b_0_0"/>
+          <p:cNvPr id="121" name="Google Shape;121;gc41ef6c38b_0_0"/>
           <p:cNvSpPr txBox="1"/>
           <p:nvPr/>
         </p:nvSpPr>
         <p:spPr>
           <a:xfrm>
-            <a:off x="3583587" y="3585425"/>
-            <a:ext cx="1793400" cy="585000"/>
+            <a:off x="3675312" y="3665388"/>
+            <a:ext cx="1793400" cy="554100"/>
           </a:xfrm>
           <a:prstGeom prst="rect">
             <a:avLst/>
@@ -12349,7 +12297,7 @@
               <a:buNone/>
             </a:pPr>
             <a:r>
-              <a:rPr lang="en-US" sz="1300">
+              <a:rPr lang="en-US" sz="1200">
                 <a:latin typeface="Calibri"/>
                 <a:ea typeface="Calibri"/>
                 <a:cs typeface="Calibri"/>
@@ -12358,7 +12306,7 @@
               <a:t>Payment is </a:t>
             </a:r>
             <a:r>
-              <a:rPr lang="en-US" sz="1300">
+              <a:rPr lang="en-US" sz="1200">
                 <a:latin typeface="Calibri"/>
                 <a:ea typeface="Calibri"/>
                 <a:cs typeface="Calibri"/>
@@ -12367,7 +12315,7 @@
               <a:t>done</a:t>
             </a:r>
             <a:r>
-              <a:rPr lang="en-US" sz="1300">
+              <a:rPr lang="en-US" sz="1200">
                 <a:latin typeface="Calibri"/>
                 <a:ea typeface="Calibri"/>
                 <a:cs typeface="Calibri"/>
@@ -12376,7 +12324,7 @@
               <a:t> </a:t>
             </a:r>
             <a:r>
-              <a:rPr lang="en-US" sz="1300">
+              <a:rPr lang="en-US" sz="1200">
                 <a:latin typeface="Calibri"/>
                 <a:ea typeface="Calibri"/>
                 <a:cs typeface="Calibri"/>
@@ -12385,7 +12333,7 @@
               <a:t>based</a:t>
             </a:r>
             <a:r>
-              <a:rPr lang="en-US" sz="1300">
+              <a:rPr lang="en-US" sz="1200">
                 <a:latin typeface="Calibri"/>
                 <a:ea typeface="Calibri"/>
                 <a:cs typeface="Calibri"/>
@@ -12393,7 +12341,7 @@
               </a:rPr>
               <a:t> on selected services</a:t>
             </a:r>
-            <a:endParaRPr sz="1300">
+            <a:endParaRPr sz="1200">
               <a:latin typeface="Calibri"/>
               <a:ea typeface="Calibri"/>
               <a:cs typeface="Calibri"/>
@@ -12404,7 +12352,7 @@
       </p:sp>
       <p:cxnSp>
         <p:nvCxnSpPr>
-          <p:cNvPr id="123" name="Google Shape;123;gc41ef6c38b_0_0"/>
+          <p:cNvPr id="122" name="Google Shape;122;gc41ef6c38b_0_0"/>
           <p:cNvCxnSpPr>
             <a:endCxn id="93" idx="0"/>
           </p:cNvCxnSpPr>
@@ -12432,16 +12380,148 @@
       </p:cxnSp>
       <p:cxnSp>
         <p:nvCxnSpPr>
+          <p:cNvPr id="123" name="Google Shape;123;gc41ef6c38b_0_0"/>
+          <p:cNvCxnSpPr/>
+          <p:nvPr/>
+        </p:nvCxnSpPr>
+        <p:spPr>
+          <a:xfrm flipH="1" rot="10800000">
+            <a:off x="3077100" y="3484975"/>
+            <a:ext cx="1800" cy="675300"/>
+          </a:xfrm>
+          <a:prstGeom prst="straightConnector1">
+            <a:avLst/>
+          </a:prstGeom>
+          <a:noFill/>
+          <a:ln cap="flat" cmpd="sng" w="9525">
+            <a:solidFill>
+              <a:schemeClr val="dk2"/>
+            </a:solidFill>
+            <a:prstDash val="solid"/>
+            <a:round/>
+            <a:headEnd len="med" w="med" type="none"/>
+            <a:tailEnd len="med" w="med" type="triangle"/>
+          </a:ln>
+        </p:spPr>
+      </p:cxnSp>
+      <p:sp>
+        <p:nvSpPr>
           <p:cNvPr id="124" name="Google Shape;124;gc41ef6c38b_0_0"/>
+          <p:cNvSpPr txBox="1"/>
+          <p:nvPr/>
+        </p:nvSpPr>
+        <p:spPr>
+          <a:xfrm rot="1473">
+            <a:off x="6602444" y="751600"/>
+            <a:ext cx="2100300" cy="369300"/>
+          </a:xfrm>
+          <a:prstGeom prst="rect">
+            <a:avLst/>
+          </a:prstGeom>
+          <a:noFill/>
+          <a:ln>
+            <a:noFill/>
+          </a:ln>
+        </p:spPr>
+        <p:txBody>
+          <a:bodyPr anchorCtr="0" anchor="t" bIns="91425" lIns="91425" spcFirstLastPara="1" rIns="91425" wrap="square" tIns="91425">
+            <a:spAutoFit/>
+          </a:bodyPr>
+          <a:lstStyle/>
+          <a:p>
+            <a:pPr indent="0" lvl="0" marL="0" rtl="0" algn="ctr">
+              <a:spcBef>
+                <a:spcPts val="0"/>
+              </a:spcBef>
+              <a:spcAft>
+                <a:spcPts val="0"/>
+              </a:spcAft>
+              <a:buNone/>
+            </a:pPr>
+            <a:r>
+              <a:rPr lang="en-US" sz="1200">
+                <a:latin typeface="Calibri"/>
+                <a:ea typeface="Calibri"/>
+                <a:cs typeface="Calibri"/>
+                <a:sym typeface="Calibri"/>
+              </a:rPr>
+              <a:t>Location Information of User</a:t>
+            </a:r>
+            <a:endParaRPr sz="1200">
+              <a:latin typeface="Calibri"/>
+              <a:ea typeface="Calibri"/>
+              <a:cs typeface="Calibri"/>
+              <a:sym typeface="Calibri"/>
+            </a:endParaRPr>
+          </a:p>
+        </p:txBody>
+      </p:sp>
+      <p:sp>
+        <p:nvSpPr>
+          <p:cNvPr id="125" name="Google Shape;125;gc41ef6c38b_0_0"/>
+          <p:cNvSpPr/>
+          <p:nvPr/>
+        </p:nvSpPr>
+        <p:spPr>
+          <a:xfrm>
+            <a:off x="2581675" y="2134600"/>
+            <a:ext cx="1373100" cy="509700"/>
+          </a:xfrm>
+          <a:prstGeom prst="rect">
+            <a:avLst/>
+          </a:prstGeom>
+          <a:solidFill>
+            <a:srgbClr val="A4C2F4"/>
+          </a:solidFill>
+          <a:ln cap="flat" cmpd="sng" w="9525">
+            <a:solidFill>
+              <a:schemeClr val="dk2"/>
+            </a:solidFill>
+            <a:prstDash val="solid"/>
+            <a:round/>
+            <a:headEnd len="sm" w="sm" type="none"/>
+            <a:tailEnd len="sm" w="sm" type="none"/>
+          </a:ln>
+        </p:spPr>
+        <p:txBody>
+          <a:bodyPr anchorCtr="0" anchor="ctr" bIns="91425" lIns="91425" spcFirstLastPara="1" rIns="91425" wrap="square" tIns="91425">
+            <a:noAutofit/>
+          </a:bodyPr>
+          <a:lstStyle/>
+          <a:p>
+            <a:pPr indent="0" lvl="0" marL="0" rtl="0" algn="ctr">
+              <a:spcBef>
+                <a:spcPts val="0"/>
+              </a:spcBef>
+              <a:spcAft>
+                <a:spcPts val="0"/>
+              </a:spcAft>
+              <a:buNone/>
+            </a:pPr>
+            <a:r>
+              <a:rPr lang="en-US" sz="1200"/>
+              <a:t>01.02 Sign In </a:t>
+            </a:r>
+            <a:r>
+              <a:rPr lang="en-US" sz="1200"/>
+              <a:t>Account</a:t>
+            </a:r>
+            <a:endParaRPr sz="1200"/>
+          </a:p>
+        </p:txBody>
+      </p:sp>
+      <p:cxnSp>
+        <p:nvCxnSpPr>
+          <p:cNvPr id="126" name="Google Shape;126;gc41ef6c38b_0_0"/>
           <p:cNvCxnSpPr>
-            <a:endCxn id="88" idx="2"/>
+            <a:endCxn id="125" idx="1"/>
           </p:cNvCxnSpPr>
           <p:nvPr/>
         </p:nvCxnSpPr>
         <p:spPr>
-          <a:xfrm rot="10800000">
-            <a:off x="3133700" y="3129363"/>
-            <a:ext cx="7500" cy="1042200"/>
+          <a:xfrm>
+            <a:off x="599875" y="2348350"/>
+            <a:ext cx="1981800" cy="41100"/>
           </a:xfrm>
           <a:prstGeom prst="straightConnector1">
             <a:avLst/>
@@ -12460,14 +12540,16 @@
       </p:cxnSp>
       <p:cxnSp>
         <p:nvCxnSpPr>
-          <p:cNvPr id="125" name="Google Shape;125;gc41ef6c38b_0_0"/>
-          <p:cNvCxnSpPr/>
+          <p:cNvPr id="127" name="Google Shape;127;gc41ef6c38b_0_0"/>
+          <p:cNvCxnSpPr>
+            <a:stCxn id="87" idx="2"/>
+          </p:cNvCxnSpPr>
           <p:nvPr/>
         </p:nvCxnSpPr>
         <p:spPr>
-          <a:xfrm flipH="1" rot="10800000">
-            <a:off x="7734025" y="1775100"/>
-            <a:ext cx="7200" cy="1564200"/>
+          <a:xfrm flipH="1">
+            <a:off x="5900938" y="1400225"/>
+            <a:ext cx="3600" cy="1110900"/>
           </a:xfrm>
           <a:prstGeom prst="straightConnector1">
             <a:avLst/>
@@ -12486,14 +12568,14 @@
       </p:cxnSp>
       <p:cxnSp>
         <p:nvCxnSpPr>
-          <p:cNvPr id="126" name="Google Shape;126;gc41ef6c38b_0_0"/>
+          <p:cNvPr id="128" name="Google Shape;128;gc41ef6c38b_0_0"/>
           <p:cNvCxnSpPr/>
           <p:nvPr/>
         </p:nvCxnSpPr>
         <p:spPr>
-          <a:xfrm rot="10800000">
-            <a:off x="6651325" y="1746975"/>
-            <a:ext cx="1082700" cy="28200"/>
+          <a:xfrm flipH="1">
+            <a:off x="3954700" y="2511225"/>
+            <a:ext cx="1939200" cy="13200"/>
           </a:xfrm>
           <a:prstGeom prst="straightConnector1">
             <a:avLst/>
@@ -12512,14 +12594,14 @@
       </p:cxnSp>
       <p:sp>
         <p:nvSpPr>
-          <p:cNvPr id="127" name="Google Shape;127;gc41ef6c38b_0_0"/>
+          <p:cNvPr id="129" name="Google Shape;129;gc41ef6c38b_0_0"/>
           <p:cNvSpPr txBox="1"/>
           <p:nvPr/>
         </p:nvSpPr>
         <p:spPr>
-          <a:xfrm rot="1473">
-            <a:off x="6921794" y="1169125"/>
-            <a:ext cx="2100300" cy="384900"/>
+          <a:xfrm rot="1534">
+            <a:off x="4255574" y="2413508"/>
+            <a:ext cx="1344600" cy="369300"/>
           </a:xfrm>
           <a:prstGeom prst="rect">
             <a:avLst/>
@@ -12545,15 +12627,171 @@
               <a:buNone/>
             </a:pPr>
             <a:r>
-              <a:rPr lang="en-US" sz="1300">
+              <a:rPr lang="en-US" sz="1200">
                 <a:latin typeface="Calibri"/>
                 <a:ea typeface="Calibri"/>
                 <a:cs typeface="Calibri"/>
                 <a:sym typeface="Calibri"/>
               </a:rPr>
-              <a:t>Location Information</a:t>
+              <a:t>Verification</a:t>
             </a:r>
-            <a:endParaRPr sz="1300">
+            <a:endParaRPr sz="1200">
+              <a:latin typeface="Calibri"/>
+              <a:ea typeface="Calibri"/>
+              <a:cs typeface="Calibri"/>
+              <a:sym typeface="Calibri"/>
+            </a:endParaRPr>
+          </a:p>
+        </p:txBody>
+      </p:sp>
+      <p:sp>
+        <p:nvSpPr>
+          <p:cNvPr id="130" name="Google Shape;130;gc41ef6c38b_0_0"/>
+          <p:cNvSpPr txBox="1"/>
+          <p:nvPr/>
+        </p:nvSpPr>
+        <p:spPr>
+          <a:xfrm rot="1534">
+            <a:off x="1050661" y="2054296"/>
+            <a:ext cx="1344600" cy="369300"/>
+          </a:xfrm>
+          <a:prstGeom prst="rect">
+            <a:avLst/>
+          </a:prstGeom>
+          <a:noFill/>
+          <a:ln>
+            <a:noFill/>
+          </a:ln>
+        </p:spPr>
+        <p:txBody>
+          <a:bodyPr anchorCtr="0" anchor="t" bIns="91425" lIns="91425" spcFirstLastPara="1" rIns="91425" wrap="square" tIns="91425">
+            <a:spAutoFit/>
+          </a:bodyPr>
+          <a:lstStyle/>
+          <a:p>
+            <a:pPr indent="0" lvl="0" marL="0" rtl="0" algn="ctr">
+              <a:spcBef>
+                <a:spcPts val="0"/>
+              </a:spcBef>
+              <a:spcAft>
+                <a:spcPts val="0"/>
+              </a:spcAft>
+              <a:buNone/>
+            </a:pPr>
+            <a:r>
+              <a:rPr lang="en-US" sz="1200">
+                <a:latin typeface="Calibri"/>
+                <a:ea typeface="Calibri"/>
+                <a:cs typeface="Calibri"/>
+                <a:sym typeface="Calibri"/>
+              </a:rPr>
+              <a:t>User Details</a:t>
+            </a:r>
+            <a:endParaRPr sz="1200">
+              <a:latin typeface="Calibri"/>
+              <a:ea typeface="Calibri"/>
+              <a:cs typeface="Calibri"/>
+              <a:sym typeface="Calibri"/>
+            </a:endParaRPr>
+          </a:p>
+        </p:txBody>
+      </p:sp>
+      <p:cxnSp>
+        <p:nvCxnSpPr>
+          <p:cNvPr id="131" name="Google Shape;131;gc41ef6c38b_0_0"/>
+          <p:cNvCxnSpPr/>
+          <p:nvPr/>
+        </p:nvCxnSpPr>
+        <p:spPr>
+          <a:xfrm flipH="1">
+            <a:off x="3961825" y="2235225"/>
+            <a:ext cx="1641900" cy="7200"/>
+          </a:xfrm>
+          <a:prstGeom prst="straightConnector1">
+            <a:avLst/>
+          </a:prstGeom>
+          <a:noFill/>
+          <a:ln cap="flat" cmpd="sng" w="9525">
+            <a:solidFill>
+              <a:schemeClr val="dk2"/>
+            </a:solidFill>
+            <a:prstDash val="solid"/>
+            <a:round/>
+            <a:headEnd len="med" w="med" type="none"/>
+            <a:tailEnd len="med" w="med" type="none"/>
+          </a:ln>
+        </p:spPr>
+      </p:cxnSp>
+      <p:cxnSp>
+        <p:nvCxnSpPr>
+          <p:cNvPr id="132" name="Google Shape;132;gc41ef6c38b_0_0"/>
+          <p:cNvCxnSpPr/>
+          <p:nvPr/>
+        </p:nvCxnSpPr>
+        <p:spPr>
+          <a:xfrm rot="10800000">
+            <a:off x="5582675" y="1400025"/>
+            <a:ext cx="6900" cy="835200"/>
+          </a:xfrm>
+          <a:prstGeom prst="straightConnector1">
+            <a:avLst/>
+          </a:prstGeom>
+          <a:noFill/>
+          <a:ln cap="flat" cmpd="sng" w="9525">
+            <a:solidFill>
+              <a:schemeClr val="dk2"/>
+            </a:solidFill>
+            <a:prstDash val="solid"/>
+            <a:round/>
+            <a:headEnd len="med" w="med" type="none"/>
+            <a:tailEnd len="med" w="med" type="triangle"/>
+          </a:ln>
+        </p:spPr>
+      </p:cxnSp>
+      <p:sp>
+        <p:nvSpPr>
+          <p:cNvPr id="133" name="Google Shape;133;gc41ef6c38b_0_0"/>
+          <p:cNvSpPr txBox="1"/>
+          <p:nvPr/>
+        </p:nvSpPr>
+        <p:spPr>
+          <a:xfrm rot="1534">
+            <a:off x="4141211" y="1947208"/>
+            <a:ext cx="1344600" cy="369300"/>
+          </a:xfrm>
+          <a:prstGeom prst="rect">
+            <a:avLst/>
+          </a:prstGeom>
+          <a:noFill/>
+          <a:ln>
+            <a:noFill/>
+          </a:ln>
+        </p:spPr>
+        <p:txBody>
+          <a:bodyPr anchorCtr="0" anchor="t" bIns="91425" lIns="91425" spcFirstLastPara="1" rIns="91425" wrap="square" tIns="91425">
+            <a:spAutoFit/>
+          </a:bodyPr>
+          <a:lstStyle/>
+          <a:p>
+            <a:pPr indent="0" lvl="0" marL="0" rtl="0" algn="ctr">
+              <a:spcBef>
+                <a:spcPts val="0"/>
+              </a:spcBef>
+              <a:spcAft>
+                <a:spcPts val="0"/>
+              </a:spcAft>
+              <a:buNone/>
+            </a:pPr>
+            <a:r>
+              <a:rPr lang="en-US" sz="1200">
+                <a:latin typeface="Calibri"/>
+                <a:ea typeface="Calibri"/>
+                <a:cs typeface="Calibri"/>
+                <a:sym typeface="Calibri"/>
+              </a:rPr>
+              <a:t>Sign In data</a:t>
+            </a:r>
+            <a:endParaRPr sz="1200">
               <a:latin typeface="Calibri"/>
               <a:ea typeface="Calibri"/>
               <a:cs typeface="Calibri"/>

</xml_diff>